<commit_message>
Added github link in ppt
</commit_message>
<xml_diff>
--- a/documents/B-14_FINAL.pptx
+++ b/documents/B-14_FINAL.pptx
@@ -242,7 +242,7 @@
           <a:p>
             <a:fld id="{A6E5FBE0-5C21-4E83-8069-52D09BCDD71E}" type="datetimeFigureOut">
               <a:rPr lang="en-IN" smtClean="0"/>
-              <a:t>03-07-2022</a:t>
+              <a:t>04-07-2022</a:t>
             </a:fld>
             <a:endParaRPr lang="en-IN"/>
           </a:p>
@@ -411,7 +411,7 @@
           <a:p>
             <a:fld id="{D6846DD5-0A30-46AD-B2E1-F25508726044}" type="datetimeFigureOut">
               <a:rPr lang="en-IN" smtClean="0"/>
-              <a:t>03-07-2022</a:t>
+              <a:t>04-07-2022</a:t>
             </a:fld>
             <a:endParaRPr lang="en-IN"/>
           </a:p>
@@ -3037,7 +3037,7 @@
         </p:nvSpPr>
         <p:spPr>
           <a:xfrm>
-            <a:off x="3759654" y="2482905"/>
+            <a:off x="3759653" y="2367534"/>
             <a:ext cx="4672674" cy="898049"/>
           </a:xfrm>
           <a:prstGeom prst="rect">
@@ -3273,6 +3273,14 @@
               <a:rPr lang="en-IN" sz="1400" b="0" dirty="0"/>
               <a:t>Assistant Professor</a:t>
             </a:r>
+          </a:p>
+          <a:p>
+            <a:pPr>
+              <a:spcBef>
+                <a:spcPts val="200"/>
+              </a:spcBef>
+            </a:pPr>
+            <a:endParaRPr lang="en-IN" sz="1400" b="0" dirty="0"/>
           </a:p>
         </p:txBody>
       </p:sp>
@@ -4378,6 +4386,48 @@
           </a:prstGeom>
         </p:spPr>
       </p:pic>
+      <p:sp>
+        <p:nvSpPr>
+          <p:cNvPr id="2" name="TextBox 1">
+            <a:extLst>
+              <a:ext uri="{FF2B5EF4-FFF2-40B4-BE49-F238E27FC236}">
+                <a16:creationId xmlns:a16="http://schemas.microsoft.com/office/drawing/2014/main" id="{2E069878-9E25-FC68-E4B5-5A1C73AA4D6E}"/>
+              </a:ext>
+            </a:extLst>
+          </p:cNvPr>
+          <p:cNvSpPr txBox="1"/>
+          <p:nvPr/>
+        </p:nvSpPr>
+        <p:spPr>
+          <a:xfrm>
+            <a:off x="755009" y="3265583"/>
+            <a:ext cx="10245513" cy="369332"/>
+          </a:xfrm>
+          <a:prstGeom prst="rect">
+            <a:avLst/>
+          </a:prstGeom>
+          <a:noFill/>
+        </p:spPr>
+        <p:txBody>
+          <a:bodyPr wrap="square" rtlCol="0">
+            <a:spAutoFit/>
+          </a:bodyPr>
+          <a:lstStyle/>
+          <a:p>
+            <a:r>
+              <a:rPr lang="en-IN" dirty="0"/>
+              <a:t>GitHub Link: </a:t>
+            </a:r>
+            <a:r>
+              <a:rPr lang="en-IN" dirty="0">
+                <a:hlinkClick r:id="rId3" action="ppaction://hlinksldjump"/>
+              </a:rPr>
+              <a:t>https://github.com/sreedevi22/-Comparative_Analysis_of_flood_prediction_using_ML</a:t>
+            </a:r>
+            <a:endParaRPr lang="en-IN" dirty="0"/>
+          </a:p>
+        </p:txBody>
+      </p:sp>
     </p:spTree>
     <p:extLst>
       <p:ext uri="{BB962C8B-B14F-4D97-AF65-F5344CB8AC3E}">

</xml_diff>